<commit_message>
add comment to multithreading
</commit_message>
<xml_diff>
--- a/multithreading/multithreading.pptx
+++ b/multithreading/multithreading.pptx
@@ -5,7 +5,7 @@
     <p:sldMasterId id="2147483648" r:id="rId1"/>
   </p:sldMasterIdLst>
   <p:notesMasterIdLst>
-    <p:notesMasterId r:id="rId44"/>
+    <p:notesMasterId r:id="rId45"/>
   </p:notesMasterIdLst>
   <p:sldIdLst>
     <p:sldId id="256" r:id="rId2"/>
@@ -38,18 +38,19 @@
     <p:sldId id="283" r:id="rId29"/>
     <p:sldId id="284" r:id="rId30"/>
     <p:sldId id="285" r:id="rId31"/>
-    <p:sldId id="286" r:id="rId32"/>
-    <p:sldId id="287" r:id="rId33"/>
-    <p:sldId id="288" r:id="rId34"/>
-    <p:sldId id="289" r:id="rId35"/>
-    <p:sldId id="290" r:id="rId36"/>
-    <p:sldId id="291" r:id="rId37"/>
-    <p:sldId id="292" r:id="rId38"/>
-    <p:sldId id="293" r:id="rId39"/>
-    <p:sldId id="294" r:id="rId40"/>
-    <p:sldId id="295" r:id="rId41"/>
-    <p:sldId id="296" r:id="rId42"/>
-    <p:sldId id="297" r:id="rId43"/>
+    <p:sldId id="299" r:id="rId32"/>
+    <p:sldId id="286" r:id="rId33"/>
+    <p:sldId id="287" r:id="rId34"/>
+    <p:sldId id="288" r:id="rId35"/>
+    <p:sldId id="289" r:id="rId36"/>
+    <p:sldId id="290" r:id="rId37"/>
+    <p:sldId id="291" r:id="rId38"/>
+    <p:sldId id="292" r:id="rId39"/>
+    <p:sldId id="293" r:id="rId40"/>
+    <p:sldId id="294" r:id="rId41"/>
+    <p:sldId id="295" r:id="rId42"/>
+    <p:sldId id="296" r:id="rId43"/>
+    <p:sldId id="297" r:id="rId44"/>
   </p:sldIdLst>
   <p:sldSz cx="12192000" cy="6858000"/>
   <p:notesSz cx="6858000" cy="9144000"/>
@@ -249,7 +250,7 @@
           <a:p>
             <a:fld id="{56714037-B3C4-471F-8C31-A0B0AC462F18}" type="datetimeFigureOut">
               <a:rPr lang="ru-RU" smtClean="0"/>
-              <a:t>14.03.2018</a:t>
+              <a:t>20.02.2019</a:t>
             </a:fld>
             <a:endParaRPr lang="ru-RU"/>
           </a:p>
@@ -990,6 +991,193 @@
           <a:bodyPr/>
           <a:lstStyle/>
           <a:p>
+            <a:r>
+              <a:rPr lang="en-US" sz="1200" b="1" i="1" kern="1200" dirty="0" smtClean="0">
+                <a:solidFill>
+                  <a:schemeClr val="tx1"/>
+                </a:solidFill>
+                <a:effectLst/>
+                <a:latin typeface="+mn-lt"/>
+                <a:ea typeface="+mn-ea"/>
+                <a:cs typeface="+mn-cs"/>
+              </a:rPr>
+              <a:t>The </a:t>
+            </a:r>
+            <a:r>
+              <a:rPr lang="en-US" sz="1200" b="1" i="1" kern="1200" dirty="0" err="1" smtClean="0">
+                <a:solidFill>
+                  <a:schemeClr val="tx1"/>
+                </a:solidFill>
+                <a:effectLst/>
+                <a:latin typeface="+mn-lt"/>
+                <a:ea typeface="+mn-ea"/>
+                <a:cs typeface="+mn-cs"/>
+              </a:rPr>
+              <a:t>lockTaken</a:t>
+            </a:r>
+            <a:r>
+              <a:rPr lang="en-US" sz="1200" b="1" i="1" kern="1200" dirty="0" smtClean="0">
+                <a:solidFill>
+                  <a:schemeClr val="tx1"/>
+                </a:solidFill>
+                <a:effectLst/>
+                <a:latin typeface="+mn-lt"/>
+                <a:ea typeface="+mn-ea"/>
+                <a:cs typeface="+mn-cs"/>
+              </a:rPr>
+              <a:t> overloads</a:t>
+            </a:r>
+          </a:p>
+          <a:p>
+            <a:r>
+              <a:rPr lang="en-US" sz="1200" b="0" i="0" kern="1200" dirty="0" smtClean="0">
+                <a:solidFill>
+                  <a:schemeClr val="tx1"/>
+                </a:solidFill>
+                <a:effectLst/>
+                <a:latin typeface="+mn-lt"/>
+                <a:ea typeface="+mn-ea"/>
+                <a:cs typeface="+mn-cs"/>
+              </a:rPr>
+              <a:t>The code that we just demonstrated is exactly what the C# 1.0, 2.0, and 3.0 compilers produce in translating a lock statement.</a:t>
+            </a:r>
+          </a:p>
+          <a:p>
+            <a:r>
+              <a:rPr lang="en-US" sz="1200" b="0" i="0" kern="1200" dirty="0" smtClean="0">
+                <a:solidFill>
+                  <a:schemeClr val="tx1"/>
+                </a:solidFill>
+                <a:effectLst/>
+                <a:latin typeface="+mn-lt"/>
+                <a:ea typeface="+mn-ea"/>
+                <a:cs typeface="+mn-cs"/>
+              </a:rPr>
+              <a:t>There’s a subtle vulnerability in this code, however. Consider the (unlikely) event of an exception being thrown within the implementation of </a:t>
+            </a:r>
+            <a:r>
+              <a:rPr lang="en-US" sz="1200" b="0" i="0" kern="1200" dirty="0" err="1" smtClean="0">
+                <a:solidFill>
+                  <a:schemeClr val="tx1"/>
+                </a:solidFill>
+                <a:effectLst/>
+                <a:latin typeface="+mn-lt"/>
+                <a:ea typeface="+mn-ea"/>
+                <a:cs typeface="+mn-cs"/>
+              </a:rPr>
+              <a:t>Monitor.Enter</a:t>
+            </a:r>
+            <a:r>
+              <a:rPr lang="en-US" sz="1200" b="0" i="0" kern="1200" dirty="0" smtClean="0">
+                <a:solidFill>
+                  <a:schemeClr val="tx1"/>
+                </a:solidFill>
+                <a:effectLst/>
+                <a:latin typeface="+mn-lt"/>
+                <a:ea typeface="+mn-ea"/>
+                <a:cs typeface="+mn-cs"/>
+              </a:rPr>
+              <a:t>, or between the call to </a:t>
+            </a:r>
+            <a:r>
+              <a:rPr lang="en-US" sz="1200" b="0" i="0" kern="1200" dirty="0" err="1" smtClean="0">
+                <a:solidFill>
+                  <a:schemeClr val="tx1"/>
+                </a:solidFill>
+                <a:effectLst/>
+                <a:latin typeface="+mn-lt"/>
+                <a:ea typeface="+mn-ea"/>
+                <a:cs typeface="+mn-cs"/>
+              </a:rPr>
+              <a:t>Monitor.Enter</a:t>
+            </a:r>
+            <a:r>
+              <a:rPr lang="en-US" sz="1200" b="0" i="0" kern="1200" dirty="0" smtClean="0">
+                <a:solidFill>
+                  <a:schemeClr val="tx1"/>
+                </a:solidFill>
+                <a:effectLst/>
+                <a:latin typeface="+mn-lt"/>
+                <a:ea typeface="+mn-ea"/>
+                <a:cs typeface="+mn-cs"/>
+              </a:rPr>
+              <a:t> and the try block (due, perhaps, to </a:t>
+            </a:r>
+            <a:r>
+              <a:rPr lang="en-US" sz="1200" b="0" i="0" kern="1200" dirty="0" smtClean="0">
+                <a:solidFill>
+                  <a:schemeClr val="tx1"/>
+                </a:solidFill>
+                <a:effectLst/>
+                <a:latin typeface="+mn-lt"/>
+                <a:ea typeface="+mn-ea"/>
+                <a:cs typeface="+mn-cs"/>
+                <a:hlinkClick r:id="rId3"/>
+              </a:rPr>
+              <a:t>Abort</a:t>
+            </a:r>
+            <a:r>
+              <a:rPr lang="en-US" sz="1200" b="0" i="0" kern="1200" dirty="0" smtClean="0">
+                <a:solidFill>
+                  <a:schemeClr val="tx1"/>
+                </a:solidFill>
+                <a:effectLst/>
+                <a:latin typeface="+mn-lt"/>
+                <a:ea typeface="+mn-ea"/>
+                <a:cs typeface="+mn-cs"/>
+              </a:rPr>
+              <a:t> being called on that thread — or an </a:t>
+            </a:r>
+            <a:r>
+              <a:rPr lang="en-US" sz="1200" b="0" i="0" kern="1200" dirty="0" err="1" smtClean="0">
+                <a:solidFill>
+                  <a:schemeClr val="tx1"/>
+                </a:solidFill>
+                <a:effectLst/>
+                <a:latin typeface="+mn-lt"/>
+                <a:ea typeface="+mn-ea"/>
+                <a:cs typeface="+mn-cs"/>
+              </a:rPr>
+              <a:t>OutOfMemoryException</a:t>
+            </a:r>
+            <a:r>
+              <a:rPr lang="en-US" sz="1200" b="0" i="0" kern="1200" dirty="0" smtClean="0">
+                <a:solidFill>
+                  <a:schemeClr val="tx1"/>
+                </a:solidFill>
+                <a:effectLst/>
+                <a:latin typeface="+mn-lt"/>
+                <a:ea typeface="+mn-ea"/>
+                <a:cs typeface="+mn-cs"/>
+              </a:rPr>
+              <a:t> being thrown). In such a scenario, the lock may or may not be taken. If the lock </a:t>
+            </a:r>
+            <a:r>
+              <a:rPr lang="en-US" sz="1200" b="0" i="1" kern="1200" dirty="0" smtClean="0">
+                <a:solidFill>
+                  <a:schemeClr val="tx1"/>
+                </a:solidFill>
+                <a:effectLst/>
+                <a:latin typeface="+mn-lt"/>
+                <a:ea typeface="+mn-ea"/>
+                <a:cs typeface="+mn-cs"/>
+              </a:rPr>
+              <a:t>is</a:t>
+            </a:r>
+            <a:r>
+              <a:rPr lang="en-US" sz="1200" b="0" i="0" kern="1200" dirty="0" smtClean="0">
+                <a:solidFill>
+                  <a:schemeClr val="tx1"/>
+                </a:solidFill>
+                <a:effectLst/>
+                <a:latin typeface="+mn-lt"/>
+                <a:ea typeface="+mn-ea"/>
+                <a:cs typeface="+mn-cs"/>
+              </a:rPr>
+              <a:t> taken, it won’t be released — because we’ll never enter the try/finally block. This will result in a leaked lock.</a:t>
+            </a:r>
+          </a:p>
+          <a:p>
             <a:endParaRPr lang="ru-RU" dirty="0"/>
           </a:p>
         </p:txBody>
@@ -1074,6 +1262,193 @@
           <a:bodyPr/>
           <a:lstStyle/>
           <a:p>
+            <a:r>
+              <a:rPr lang="en-US" sz="1200" b="1" i="1" kern="1200" dirty="0" smtClean="0">
+                <a:solidFill>
+                  <a:schemeClr val="tx1"/>
+                </a:solidFill>
+                <a:effectLst/>
+                <a:latin typeface="+mn-lt"/>
+                <a:ea typeface="+mn-ea"/>
+                <a:cs typeface="+mn-cs"/>
+              </a:rPr>
+              <a:t>The </a:t>
+            </a:r>
+            <a:r>
+              <a:rPr lang="en-US" sz="1200" b="1" i="1" kern="1200" dirty="0" err="1" smtClean="0">
+                <a:solidFill>
+                  <a:schemeClr val="tx1"/>
+                </a:solidFill>
+                <a:effectLst/>
+                <a:latin typeface="+mn-lt"/>
+                <a:ea typeface="+mn-ea"/>
+                <a:cs typeface="+mn-cs"/>
+              </a:rPr>
+              <a:t>lockTaken</a:t>
+            </a:r>
+            <a:r>
+              <a:rPr lang="en-US" sz="1200" b="1" i="1" kern="1200" dirty="0" smtClean="0">
+                <a:solidFill>
+                  <a:schemeClr val="tx1"/>
+                </a:solidFill>
+                <a:effectLst/>
+                <a:latin typeface="+mn-lt"/>
+                <a:ea typeface="+mn-ea"/>
+                <a:cs typeface="+mn-cs"/>
+              </a:rPr>
+              <a:t> overloads</a:t>
+            </a:r>
+          </a:p>
+          <a:p>
+            <a:r>
+              <a:rPr lang="en-US" sz="1200" b="0" i="0" kern="1200" dirty="0" smtClean="0">
+                <a:solidFill>
+                  <a:schemeClr val="tx1"/>
+                </a:solidFill>
+                <a:effectLst/>
+                <a:latin typeface="+mn-lt"/>
+                <a:ea typeface="+mn-ea"/>
+                <a:cs typeface="+mn-cs"/>
+              </a:rPr>
+              <a:t>The code that we just demonstrated is exactly what the C# 1.0, 2.0, and 3.0 compilers produce in translating a lock statement.</a:t>
+            </a:r>
+          </a:p>
+          <a:p>
+            <a:r>
+              <a:rPr lang="en-US" sz="1200" b="0" i="0" kern="1200" dirty="0" smtClean="0">
+                <a:solidFill>
+                  <a:schemeClr val="tx1"/>
+                </a:solidFill>
+                <a:effectLst/>
+                <a:latin typeface="+mn-lt"/>
+                <a:ea typeface="+mn-ea"/>
+                <a:cs typeface="+mn-cs"/>
+              </a:rPr>
+              <a:t>There’s a subtle vulnerability in this code, however. Consider the (unlikely) event of an exception being thrown within the implementation of </a:t>
+            </a:r>
+            <a:r>
+              <a:rPr lang="en-US" sz="1200" b="0" i="0" kern="1200" dirty="0" err="1" smtClean="0">
+                <a:solidFill>
+                  <a:schemeClr val="tx1"/>
+                </a:solidFill>
+                <a:effectLst/>
+                <a:latin typeface="+mn-lt"/>
+                <a:ea typeface="+mn-ea"/>
+                <a:cs typeface="+mn-cs"/>
+              </a:rPr>
+              <a:t>Monitor.Enter</a:t>
+            </a:r>
+            <a:r>
+              <a:rPr lang="en-US" sz="1200" b="0" i="0" kern="1200" dirty="0" smtClean="0">
+                <a:solidFill>
+                  <a:schemeClr val="tx1"/>
+                </a:solidFill>
+                <a:effectLst/>
+                <a:latin typeface="+mn-lt"/>
+                <a:ea typeface="+mn-ea"/>
+                <a:cs typeface="+mn-cs"/>
+              </a:rPr>
+              <a:t>, or between the call to </a:t>
+            </a:r>
+            <a:r>
+              <a:rPr lang="en-US" sz="1200" b="0" i="0" kern="1200" dirty="0" err="1" smtClean="0">
+                <a:solidFill>
+                  <a:schemeClr val="tx1"/>
+                </a:solidFill>
+                <a:effectLst/>
+                <a:latin typeface="+mn-lt"/>
+                <a:ea typeface="+mn-ea"/>
+                <a:cs typeface="+mn-cs"/>
+              </a:rPr>
+              <a:t>Monitor.Enter</a:t>
+            </a:r>
+            <a:r>
+              <a:rPr lang="en-US" sz="1200" b="0" i="0" kern="1200" dirty="0" smtClean="0">
+                <a:solidFill>
+                  <a:schemeClr val="tx1"/>
+                </a:solidFill>
+                <a:effectLst/>
+                <a:latin typeface="+mn-lt"/>
+                <a:ea typeface="+mn-ea"/>
+                <a:cs typeface="+mn-cs"/>
+              </a:rPr>
+              <a:t> and the try block (due, perhaps, to </a:t>
+            </a:r>
+            <a:r>
+              <a:rPr lang="en-US" sz="1200" b="0" i="0" kern="1200" dirty="0" smtClean="0">
+                <a:solidFill>
+                  <a:schemeClr val="tx1"/>
+                </a:solidFill>
+                <a:effectLst/>
+                <a:latin typeface="+mn-lt"/>
+                <a:ea typeface="+mn-ea"/>
+                <a:cs typeface="+mn-cs"/>
+                <a:hlinkClick r:id="rId3"/>
+              </a:rPr>
+              <a:t>Abort</a:t>
+            </a:r>
+            <a:r>
+              <a:rPr lang="en-US" sz="1200" b="0" i="0" kern="1200" dirty="0" smtClean="0">
+                <a:solidFill>
+                  <a:schemeClr val="tx1"/>
+                </a:solidFill>
+                <a:effectLst/>
+                <a:latin typeface="+mn-lt"/>
+                <a:ea typeface="+mn-ea"/>
+                <a:cs typeface="+mn-cs"/>
+              </a:rPr>
+              <a:t> being called on that thread — or an </a:t>
+            </a:r>
+            <a:r>
+              <a:rPr lang="en-US" sz="1200" b="0" i="0" kern="1200" dirty="0" err="1" smtClean="0">
+                <a:solidFill>
+                  <a:schemeClr val="tx1"/>
+                </a:solidFill>
+                <a:effectLst/>
+                <a:latin typeface="+mn-lt"/>
+                <a:ea typeface="+mn-ea"/>
+                <a:cs typeface="+mn-cs"/>
+              </a:rPr>
+              <a:t>OutOfMemoryException</a:t>
+            </a:r>
+            <a:r>
+              <a:rPr lang="en-US" sz="1200" b="0" i="0" kern="1200" dirty="0" smtClean="0">
+                <a:solidFill>
+                  <a:schemeClr val="tx1"/>
+                </a:solidFill>
+                <a:effectLst/>
+                <a:latin typeface="+mn-lt"/>
+                <a:ea typeface="+mn-ea"/>
+                <a:cs typeface="+mn-cs"/>
+              </a:rPr>
+              <a:t> being thrown). In such a scenario, the lock may or may not be taken. If the lock </a:t>
+            </a:r>
+            <a:r>
+              <a:rPr lang="en-US" sz="1200" b="0" i="1" kern="1200" dirty="0" smtClean="0">
+                <a:solidFill>
+                  <a:schemeClr val="tx1"/>
+                </a:solidFill>
+                <a:effectLst/>
+                <a:latin typeface="+mn-lt"/>
+                <a:ea typeface="+mn-ea"/>
+                <a:cs typeface="+mn-cs"/>
+              </a:rPr>
+              <a:t>is</a:t>
+            </a:r>
+            <a:r>
+              <a:rPr lang="en-US" sz="1200" b="0" i="0" kern="1200" dirty="0" smtClean="0">
+                <a:solidFill>
+                  <a:schemeClr val="tx1"/>
+                </a:solidFill>
+                <a:effectLst/>
+                <a:latin typeface="+mn-lt"/>
+                <a:ea typeface="+mn-ea"/>
+                <a:cs typeface="+mn-cs"/>
+              </a:rPr>
+              <a:t> taken, it won’t be released — because we’ll never enter the try/finally block. This will result in a leaked lock.</a:t>
+            </a:r>
+          </a:p>
+          <a:p>
             <a:endParaRPr lang="ru-RU" dirty="0"/>
           </a:p>
         </p:txBody>
@@ -1104,7 +1479,7 @@
     </p:spTree>
     <p:extLst>
       <p:ext uri="{BB962C8B-B14F-4D97-AF65-F5344CB8AC3E}">
-        <p14:creationId xmlns:p14="http://schemas.microsoft.com/office/powerpoint/2010/main" val="1407036849"/>
+        <p14:creationId xmlns:p14="http://schemas.microsoft.com/office/powerpoint/2010/main" val="2924247700"/>
       </p:ext>
     </p:extLst>
   </p:cSld>
@@ -1188,7 +1563,7 @@
     </p:spTree>
     <p:extLst>
       <p:ext uri="{BB962C8B-B14F-4D97-AF65-F5344CB8AC3E}">
-        <p14:creationId xmlns:p14="http://schemas.microsoft.com/office/powerpoint/2010/main" val="2709315431"/>
+        <p14:creationId xmlns:p14="http://schemas.microsoft.com/office/powerpoint/2010/main" val="1407036849"/>
       </p:ext>
     </p:extLst>
   </p:cSld>
@@ -1272,7 +1647,7 @@
     </p:spTree>
     <p:extLst>
       <p:ext uri="{BB962C8B-B14F-4D97-AF65-F5344CB8AC3E}">
-        <p14:creationId xmlns:p14="http://schemas.microsoft.com/office/powerpoint/2010/main" val="3323591563"/>
+        <p14:creationId xmlns:p14="http://schemas.microsoft.com/office/powerpoint/2010/main" val="2709315431"/>
       </p:ext>
     </p:extLst>
   </p:cSld>
@@ -1356,7 +1731,7 @@
     </p:spTree>
     <p:extLst>
       <p:ext uri="{BB962C8B-B14F-4D97-AF65-F5344CB8AC3E}">
-        <p14:creationId xmlns:p14="http://schemas.microsoft.com/office/powerpoint/2010/main" val="2940074803"/>
+        <p14:creationId xmlns:p14="http://schemas.microsoft.com/office/powerpoint/2010/main" val="3323591563"/>
       </p:ext>
     </p:extLst>
   </p:cSld>
@@ -1440,7 +1815,7 @@
     </p:spTree>
     <p:extLst>
       <p:ext uri="{BB962C8B-B14F-4D97-AF65-F5344CB8AC3E}">
-        <p14:creationId xmlns:p14="http://schemas.microsoft.com/office/powerpoint/2010/main" val="2394157610"/>
+        <p14:creationId xmlns:p14="http://schemas.microsoft.com/office/powerpoint/2010/main" val="2940074803"/>
       </p:ext>
     </p:extLst>
   </p:cSld>
@@ -1524,7 +1899,7 @@
     </p:spTree>
     <p:extLst>
       <p:ext uri="{BB962C8B-B14F-4D97-AF65-F5344CB8AC3E}">
-        <p14:creationId xmlns:p14="http://schemas.microsoft.com/office/powerpoint/2010/main" val="2324323682"/>
+        <p14:creationId xmlns:p14="http://schemas.microsoft.com/office/powerpoint/2010/main" val="2394157610"/>
       </p:ext>
     </p:extLst>
   </p:cSld>
@@ -1696,7 +2071,7 @@
     </p:spTree>
     <p:extLst>
       <p:ext uri="{BB962C8B-B14F-4D97-AF65-F5344CB8AC3E}">
-        <p14:creationId xmlns:p14="http://schemas.microsoft.com/office/powerpoint/2010/main" val="2784396257"/>
+        <p14:creationId xmlns:p14="http://schemas.microsoft.com/office/powerpoint/2010/main" val="2324323682"/>
       </p:ext>
     </p:extLst>
   </p:cSld>
@@ -1750,14 +2125,6 @@
           <a:bodyPr/>
           <a:lstStyle/>
           <a:p>
-            <a:r>
-              <a:rPr lang="en-US" dirty="0" smtClean="0"/>
-              <a:t>_x</a:t>
-            </a:r>
-            <a:r>
-              <a:rPr lang="en-US" baseline="0" dirty="0" smtClean="0"/>
-              <a:t> can be not  a zero</a:t>
-            </a:r>
             <a:endParaRPr lang="ru-RU" dirty="0"/>
           </a:p>
         </p:txBody>
@@ -1788,7 +2155,7 @@
     </p:spTree>
     <p:extLst>
       <p:ext uri="{BB962C8B-B14F-4D97-AF65-F5344CB8AC3E}">
-        <p14:creationId xmlns:p14="http://schemas.microsoft.com/office/powerpoint/2010/main" val="2786626151"/>
+        <p14:creationId xmlns:p14="http://schemas.microsoft.com/office/powerpoint/2010/main" val="2784396257"/>
       </p:ext>
     </p:extLst>
   </p:cSld>
@@ -1880,7 +2247,7 @@
     </p:spTree>
     <p:extLst>
       <p:ext uri="{BB962C8B-B14F-4D97-AF65-F5344CB8AC3E}">
-        <p14:creationId xmlns:p14="http://schemas.microsoft.com/office/powerpoint/2010/main" val="955735634"/>
+        <p14:creationId xmlns:p14="http://schemas.microsoft.com/office/powerpoint/2010/main" val="2786626151"/>
       </p:ext>
     </p:extLst>
   </p:cSld>
@@ -1972,7 +2339,7 @@
     </p:spTree>
     <p:extLst>
       <p:ext uri="{BB962C8B-B14F-4D97-AF65-F5344CB8AC3E}">
-        <p14:creationId xmlns:p14="http://schemas.microsoft.com/office/powerpoint/2010/main" val="466788646"/>
+        <p14:creationId xmlns:p14="http://schemas.microsoft.com/office/powerpoint/2010/main" val="955735634"/>
       </p:ext>
     </p:extLst>
   </p:cSld>
@@ -2064,7 +2431,7 @@
     </p:spTree>
     <p:extLst>
       <p:ext uri="{BB962C8B-B14F-4D97-AF65-F5344CB8AC3E}">
-        <p14:creationId xmlns:p14="http://schemas.microsoft.com/office/powerpoint/2010/main" val="750111627"/>
+        <p14:creationId xmlns:p14="http://schemas.microsoft.com/office/powerpoint/2010/main" val="466788646"/>
       </p:ext>
     </p:extLst>
   </p:cSld>
@@ -2148,6 +2515,98 @@
             <a:fld id="{C8EFF5E2-1FA8-4BA6-9291-11F17D47B440}" type="slidenum">
               <a:rPr lang="ru-RU" smtClean="0"/>
               <a:t>42</a:t>
+            </a:fld>
+            <a:endParaRPr lang="ru-RU"/>
+          </a:p>
+        </p:txBody>
+      </p:sp>
+    </p:spTree>
+    <p:extLst>
+      <p:ext uri="{BB962C8B-B14F-4D97-AF65-F5344CB8AC3E}">
+        <p14:creationId xmlns:p14="http://schemas.microsoft.com/office/powerpoint/2010/main" val="750111627"/>
+      </p:ext>
+    </p:extLst>
+  </p:cSld>
+  <p:clrMapOvr>
+    <a:masterClrMapping/>
+  </p:clrMapOvr>
+</p:notes>
+</file>
+
+<file path=ppt/notesSlides/notesSlide26.xml><?xml version="1.0" encoding="utf-8"?>
+<p:notes xmlns:a="http://schemas.openxmlformats.org/drawingml/2006/main" xmlns:r="http://schemas.openxmlformats.org/officeDocument/2006/relationships" xmlns:p="http://schemas.openxmlformats.org/presentationml/2006/main">
+  <p:cSld>
+    <p:spTree>
+      <p:nvGrpSpPr>
+        <p:cNvPr id="1" name=""/>
+        <p:cNvGrpSpPr/>
+        <p:nvPr/>
+      </p:nvGrpSpPr>
+      <p:grpSpPr>
+        <a:xfrm>
+          <a:off x="0" y="0"/>
+          <a:ext cx="0" cy="0"/>
+          <a:chOff x="0" y="0"/>
+          <a:chExt cx="0" cy="0"/>
+        </a:xfrm>
+      </p:grpSpPr>
+      <p:sp>
+        <p:nvSpPr>
+          <p:cNvPr id="2" name="Образ слайда 1"/>
+          <p:cNvSpPr>
+            <a:spLocks noGrp="1" noRot="1" noChangeAspect="1"/>
+          </p:cNvSpPr>
+          <p:nvPr>
+            <p:ph type="sldImg"/>
+          </p:nvPr>
+        </p:nvSpPr>
+        <p:spPr/>
+      </p:sp>
+      <p:sp>
+        <p:nvSpPr>
+          <p:cNvPr id="3" name="Заметки 2"/>
+          <p:cNvSpPr>
+            <a:spLocks noGrp="1"/>
+          </p:cNvSpPr>
+          <p:nvPr>
+            <p:ph type="body" idx="1"/>
+          </p:nvPr>
+        </p:nvSpPr>
+        <p:spPr/>
+        <p:txBody>
+          <a:bodyPr/>
+          <a:lstStyle/>
+          <a:p>
+            <a:r>
+              <a:rPr lang="en-US" dirty="0" smtClean="0"/>
+              <a:t>_x</a:t>
+            </a:r>
+            <a:r>
+              <a:rPr lang="en-US" baseline="0" dirty="0" smtClean="0"/>
+              <a:t> can be not  a zero</a:t>
+            </a:r>
+            <a:endParaRPr lang="ru-RU" dirty="0"/>
+          </a:p>
+        </p:txBody>
+      </p:sp>
+      <p:sp>
+        <p:nvSpPr>
+          <p:cNvPr id="4" name="Номер слайда 3"/>
+          <p:cNvSpPr>
+            <a:spLocks noGrp="1"/>
+          </p:cNvSpPr>
+          <p:nvPr>
+            <p:ph type="sldNum" sz="quarter" idx="10"/>
+          </p:nvPr>
+        </p:nvSpPr>
+        <p:spPr/>
+        <p:txBody>
+          <a:bodyPr/>
+          <a:lstStyle/>
+          <a:p>
+            <a:fld id="{C8EFF5E2-1FA8-4BA6-9291-11F17D47B440}" type="slidenum">
+              <a:rPr lang="ru-RU" smtClean="0"/>
+              <a:t>43</a:t>
             </a:fld>
             <a:endParaRPr lang="ru-RU"/>
           </a:p>
@@ -3553,7 +4012,7 @@
           <a:p>
             <a:fld id="{50927B2E-3DC8-4E66-AD3E-D5171ECA9D72}" type="datetimeFigureOut">
               <a:rPr lang="ru-RU" smtClean="0"/>
-              <a:t>14.03.2018</a:t>
+              <a:t>20.02.2019</a:t>
             </a:fld>
             <a:endParaRPr lang="ru-RU"/>
           </a:p>
@@ -3735,7 +4194,7 @@
           <a:p>
             <a:fld id="{50927B2E-3DC8-4E66-AD3E-D5171ECA9D72}" type="datetimeFigureOut">
               <a:rPr lang="ru-RU" smtClean="0"/>
-              <a:t>14.03.2018</a:t>
+              <a:t>20.02.2019</a:t>
             </a:fld>
             <a:endParaRPr lang="ru-RU"/>
           </a:p>
@@ -3927,7 +4386,7 @@
           <a:p>
             <a:fld id="{50927B2E-3DC8-4E66-AD3E-D5171ECA9D72}" type="datetimeFigureOut">
               <a:rPr lang="ru-RU" smtClean="0"/>
-              <a:t>14.03.2018</a:t>
+              <a:t>20.02.2019</a:t>
             </a:fld>
             <a:endParaRPr lang="ru-RU"/>
           </a:p>
@@ -4109,7 +4568,7 @@
           <a:p>
             <a:fld id="{50927B2E-3DC8-4E66-AD3E-D5171ECA9D72}" type="datetimeFigureOut">
               <a:rPr lang="ru-RU" smtClean="0"/>
-              <a:t>14.03.2018</a:t>
+              <a:t>20.02.2019</a:t>
             </a:fld>
             <a:endParaRPr lang="ru-RU"/>
           </a:p>
@@ -4367,7 +4826,7 @@
           <a:p>
             <a:fld id="{50927B2E-3DC8-4E66-AD3E-D5171ECA9D72}" type="datetimeFigureOut">
               <a:rPr lang="ru-RU" smtClean="0"/>
-              <a:t>14.03.2018</a:t>
+              <a:t>20.02.2019</a:t>
             </a:fld>
             <a:endParaRPr lang="ru-RU"/>
           </a:p>
@@ -4611,7 +5070,7 @@
           <a:p>
             <a:fld id="{50927B2E-3DC8-4E66-AD3E-D5171ECA9D72}" type="datetimeFigureOut">
               <a:rPr lang="ru-RU" smtClean="0"/>
-              <a:t>14.03.2018</a:t>
+              <a:t>20.02.2019</a:t>
             </a:fld>
             <a:endParaRPr lang="ru-RU"/>
           </a:p>
@@ -4990,7 +5449,7 @@
           <a:p>
             <a:fld id="{50927B2E-3DC8-4E66-AD3E-D5171ECA9D72}" type="datetimeFigureOut">
               <a:rPr lang="ru-RU" smtClean="0"/>
-              <a:t>14.03.2018</a:t>
+              <a:t>20.02.2019</a:t>
             </a:fld>
             <a:endParaRPr lang="ru-RU"/>
           </a:p>
@@ -5120,7 +5579,7 @@
           <a:p>
             <a:fld id="{50927B2E-3DC8-4E66-AD3E-D5171ECA9D72}" type="datetimeFigureOut">
               <a:rPr lang="ru-RU" smtClean="0"/>
-              <a:t>14.03.2018</a:t>
+              <a:t>20.02.2019</a:t>
             </a:fld>
             <a:endParaRPr lang="ru-RU"/>
           </a:p>
@@ -5227,7 +5686,7 @@
           <a:p>
             <a:fld id="{50927B2E-3DC8-4E66-AD3E-D5171ECA9D72}" type="datetimeFigureOut">
               <a:rPr lang="ru-RU" smtClean="0"/>
-              <a:t>14.03.2018</a:t>
+              <a:t>20.02.2019</a:t>
             </a:fld>
             <a:endParaRPr lang="ru-RU"/>
           </a:p>
@@ -5516,7 +5975,7 @@
           <a:p>
             <a:fld id="{50927B2E-3DC8-4E66-AD3E-D5171ECA9D72}" type="datetimeFigureOut">
               <a:rPr lang="ru-RU" smtClean="0"/>
-              <a:t>14.03.2018</a:t>
+              <a:t>20.02.2019</a:t>
             </a:fld>
             <a:endParaRPr lang="ru-RU"/>
           </a:p>
@@ -5781,7 +6240,7 @@
           <a:p>
             <a:fld id="{50927B2E-3DC8-4E66-AD3E-D5171ECA9D72}" type="datetimeFigureOut">
               <a:rPr lang="ru-RU" smtClean="0"/>
-              <a:t>14.03.2018</a:t>
+              <a:t>20.02.2019</a:t>
             </a:fld>
             <a:endParaRPr lang="ru-RU"/>
           </a:p>
@@ -6006,7 +6465,7 @@
           <a:p>
             <a:fld id="{50927B2E-3DC8-4E66-AD3E-D5171ECA9D72}" type="datetimeFigureOut">
               <a:rPr lang="ru-RU" smtClean="0"/>
-              <a:t>14.03.2018</a:t>
+              <a:t>20.02.2019</a:t>
             </a:fld>
             <a:endParaRPr lang="ru-RU"/>
           </a:p>
@@ -10031,7 +10490,7 @@
       </p:sp>
       <p:pic>
         <p:nvPicPr>
-          <p:cNvPr id="5" name="Рисунок 4"/>
+          <p:cNvPr id="4" name="Рисунок 3"/>
           <p:cNvPicPr>
             <a:picLocks noChangeAspect="1"/>
           </p:cNvPicPr>
@@ -10045,8 +10504,8 @@
         </p:blipFill>
         <p:spPr>
           <a:xfrm>
-            <a:off x="838199" y="2386806"/>
-            <a:ext cx="10506982" cy="3228975"/>
+            <a:off x="847518" y="2432820"/>
+            <a:ext cx="10506282" cy="3136947"/>
           </a:xfrm>
           <a:prstGeom prst="rect">
             <a:avLst/>
@@ -10167,6 +10626,142 @@
       </p:sp>
       <p:pic>
         <p:nvPicPr>
+          <p:cNvPr id="5" name="Рисунок 4"/>
+          <p:cNvPicPr>
+            <a:picLocks noChangeAspect="1"/>
+          </p:cNvPicPr>
+          <p:nvPr/>
+        </p:nvPicPr>
+        <p:blipFill>
+          <a:blip r:embed="rId3"/>
+          <a:stretch>
+            <a:fillRect/>
+          </a:stretch>
+        </p:blipFill>
+        <p:spPr>
+          <a:xfrm>
+            <a:off x="838199" y="2386806"/>
+            <a:ext cx="10506982" cy="3228975"/>
+          </a:xfrm>
+          <a:prstGeom prst="rect">
+            <a:avLst/>
+          </a:prstGeom>
+        </p:spPr>
+      </p:pic>
+    </p:spTree>
+    <p:extLst>
+      <p:ext uri="{BB962C8B-B14F-4D97-AF65-F5344CB8AC3E}">
+        <p14:creationId xmlns:p14="http://schemas.microsoft.com/office/powerpoint/2010/main" val="2669513588"/>
+      </p:ext>
+    </p:extLst>
+  </p:cSld>
+  <p:clrMapOvr>
+    <a:masterClrMapping/>
+  </p:clrMapOvr>
+  <mc:AlternateContent xmlns:mc="http://schemas.openxmlformats.org/markup-compatibility/2006" xmlns:p14="http://schemas.microsoft.com/office/powerpoint/2010/main">
+    <mc:Choice Requires="p14">
+      <p:transition spd="med" p14:dur="700">
+        <p:fade/>
+      </p:transition>
+    </mc:Choice>
+    <mc:Fallback xmlns="">
+      <p:transition spd="med">
+        <p:fade/>
+      </p:transition>
+    </mc:Fallback>
+  </mc:AlternateContent>
+</p:sld>
+</file>
+
+<file path=ppt/slides/slide32.xml><?xml version="1.0" encoding="utf-8"?>
+<p:sld xmlns:a="http://schemas.openxmlformats.org/drawingml/2006/main" xmlns:r="http://schemas.openxmlformats.org/officeDocument/2006/relationships" xmlns:p="http://schemas.openxmlformats.org/presentationml/2006/main">
+  <p:cSld>
+    <p:bg>
+      <p:bgPr>
+        <a:solidFill>
+          <a:schemeClr val="tx1"/>
+        </a:solidFill>
+        <a:effectLst/>
+      </p:bgPr>
+    </p:bg>
+    <p:spTree>
+      <p:nvGrpSpPr>
+        <p:cNvPr id="1" name=""/>
+        <p:cNvGrpSpPr/>
+        <p:nvPr/>
+      </p:nvGrpSpPr>
+      <p:grpSpPr>
+        <a:xfrm>
+          <a:off x="0" y="0"/>
+          <a:ext cx="0" cy="0"/>
+          <a:chOff x="0" y="0"/>
+          <a:chExt cx="0" cy="0"/>
+        </a:xfrm>
+      </p:grpSpPr>
+      <p:sp>
+        <p:nvSpPr>
+          <p:cNvPr id="2" name="Заголовок 1"/>
+          <p:cNvSpPr>
+            <a:spLocks noGrp="1"/>
+          </p:cNvSpPr>
+          <p:nvPr>
+            <p:ph type="title"/>
+          </p:nvPr>
+        </p:nvSpPr>
+        <p:spPr>
+          <a:xfrm>
+            <a:off x="838199" y="365125"/>
+            <a:ext cx="10596937" cy="1340385"/>
+          </a:xfrm>
+          <a:solidFill>
+            <a:schemeClr val="tx1"/>
+          </a:solidFill>
+        </p:spPr>
+        <p:txBody>
+          <a:bodyPr/>
+          <a:lstStyle/>
+          <a:p>
+            <a:r>
+              <a:rPr lang="en-US" b="1" dirty="0" smtClean="0">
+                <a:solidFill>
+                  <a:schemeClr val="bg1">
+                    <a:lumMod val="85000"/>
+                  </a:schemeClr>
+                </a:solidFill>
+              </a:rPr>
+              <a:t>Locking</a:t>
+            </a:r>
+            <a:endParaRPr lang="en-US" b="1" dirty="0">
+              <a:solidFill>
+                <a:schemeClr val="bg1">
+                  <a:lumMod val="85000"/>
+                </a:schemeClr>
+              </a:solidFill>
+            </a:endParaRPr>
+          </a:p>
+        </p:txBody>
+      </p:sp>
+      <p:sp>
+        <p:nvSpPr>
+          <p:cNvPr id="3" name="Объект 2"/>
+          <p:cNvSpPr>
+            <a:spLocks noGrp="1"/>
+          </p:cNvSpPr>
+          <p:nvPr>
+            <p:ph idx="1"/>
+          </p:nvPr>
+        </p:nvSpPr>
+        <p:spPr/>
+        <p:txBody>
+          <a:bodyPr/>
+          <a:lstStyle/>
+          <a:p>
+            <a:endParaRPr lang="en-US" dirty="0"/>
+          </a:p>
+        </p:txBody>
+      </p:sp>
+      <p:pic>
+        <p:nvPicPr>
           <p:cNvPr id="4" name="Рисунок 3"/>
           <p:cNvPicPr>
             <a:picLocks noChangeAspect="1"/>
@@ -10214,7 +10809,7 @@
 </p:sld>
 </file>
 
-<file path=ppt/slides/slide32.xml><?xml version="1.0" encoding="utf-8"?>
+<file path=ppt/slides/slide33.xml><?xml version="1.0" encoding="utf-8"?>
 <p:sld xmlns:a="http://schemas.openxmlformats.org/drawingml/2006/main" xmlns:r="http://schemas.openxmlformats.org/officeDocument/2006/relationships" xmlns:p="http://schemas.openxmlformats.org/presentationml/2006/main">
   <p:cSld>
     <p:bg>
@@ -10350,7 +10945,7 @@
 </p:sld>
 </file>
 
-<file path=ppt/slides/slide33.xml><?xml version="1.0" encoding="utf-8"?>
+<file path=ppt/slides/slide34.xml><?xml version="1.0" encoding="utf-8"?>
 <p:sld xmlns:a="http://schemas.openxmlformats.org/drawingml/2006/main" xmlns:r="http://schemas.openxmlformats.org/officeDocument/2006/relationships" xmlns:p="http://schemas.openxmlformats.org/presentationml/2006/main">
   <p:cSld>
     <p:bg>
@@ -10486,7 +11081,7 @@
 </p:sld>
 </file>
 
-<file path=ppt/slides/slide34.xml><?xml version="1.0" encoding="utf-8"?>
+<file path=ppt/slides/slide35.xml><?xml version="1.0" encoding="utf-8"?>
 <p:sld xmlns:a="http://schemas.openxmlformats.org/drawingml/2006/main" xmlns:r="http://schemas.openxmlformats.org/officeDocument/2006/relationships" xmlns:p="http://schemas.openxmlformats.org/presentationml/2006/main">
   <p:cSld>
     <p:bg>
@@ -10621,7 +11216,7 @@
 </p:sld>
 </file>
 
-<file path=ppt/slides/slide35.xml><?xml version="1.0" encoding="utf-8"?>
+<file path=ppt/slides/slide36.xml><?xml version="1.0" encoding="utf-8"?>
 <p:sld xmlns:a="http://schemas.openxmlformats.org/drawingml/2006/main" xmlns:r="http://schemas.openxmlformats.org/officeDocument/2006/relationships" xmlns:p="http://schemas.openxmlformats.org/presentationml/2006/main">
   <p:cSld>
     <p:bg>
@@ -10756,7 +11351,7 @@
 </p:sld>
 </file>
 
-<file path=ppt/slides/slide36.xml><?xml version="1.0" encoding="utf-8"?>
+<file path=ppt/slides/slide37.xml><?xml version="1.0" encoding="utf-8"?>
 <p:sld xmlns:a="http://schemas.openxmlformats.org/drawingml/2006/main" xmlns:r="http://schemas.openxmlformats.org/officeDocument/2006/relationships" xmlns:p="http://schemas.openxmlformats.org/presentationml/2006/main">
   <p:cSld>
     <p:bg>
@@ -10915,7 +11510,7 @@
 </p:sld>
 </file>
 
-<file path=ppt/slides/slide37.xml><?xml version="1.0" encoding="utf-8"?>
+<file path=ppt/slides/slide38.xml><?xml version="1.0" encoding="utf-8"?>
 <p:sld xmlns:a="http://schemas.openxmlformats.org/drawingml/2006/main" xmlns:r="http://schemas.openxmlformats.org/officeDocument/2006/relationships" xmlns:p="http://schemas.openxmlformats.org/presentationml/2006/main">
   <p:cSld>
     <p:bg>
@@ -11051,7 +11646,7 @@
 </p:sld>
 </file>
 
-<file path=ppt/slides/slide38.xml><?xml version="1.0" encoding="utf-8"?>
+<file path=ppt/slides/slide39.xml><?xml version="1.0" encoding="utf-8"?>
 <p:sld xmlns:a="http://schemas.openxmlformats.org/drawingml/2006/main" xmlns:r="http://schemas.openxmlformats.org/officeDocument/2006/relationships" xmlns:p="http://schemas.openxmlformats.org/presentationml/2006/main">
   <p:cSld>
     <p:bg>
@@ -11166,142 +11761,6 @@
     <p:extLst>
       <p:ext uri="{BB962C8B-B14F-4D97-AF65-F5344CB8AC3E}">
         <p14:creationId xmlns:p14="http://schemas.microsoft.com/office/powerpoint/2010/main" val="3128468372"/>
-      </p:ext>
-    </p:extLst>
-  </p:cSld>
-  <p:clrMapOvr>
-    <a:masterClrMapping/>
-  </p:clrMapOvr>
-  <mc:AlternateContent xmlns:mc="http://schemas.openxmlformats.org/markup-compatibility/2006" xmlns:p14="http://schemas.microsoft.com/office/powerpoint/2010/main">
-    <mc:Choice Requires="p14">
-      <p:transition spd="med" p14:dur="700">
-        <p:fade/>
-      </p:transition>
-    </mc:Choice>
-    <mc:Fallback xmlns="">
-      <p:transition spd="med">
-        <p:fade/>
-      </p:transition>
-    </mc:Fallback>
-  </mc:AlternateContent>
-</p:sld>
-</file>
-
-<file path=ppt/slides/slide39.xml><?xml version="1.0" encoding="utf-8"?>
-<p:sld xmlns:a="http://schemas.openxmlformats.org/drawingml/2006/main" xmlns:r="http://schemas.openxmlformats.org/officeDocument/2006/relationships" xmlns:p="http://schemas.openxmlformats.org/presentationml/2006/main">
-  <p:cSld>
-    <p:bg>
-      <p:bgPr>
-        <a:solidFill>
-          <a:schemeClr val="tx1"/>
-        </a:solidFill>
-        <a:effectLst/>
-      </p:bgPr>
-    </p:bg>
-    <p:spTree>
-      <p:nvGrpSpPr>
-        <p:cNvPr id="1" name=""/>
-        <p:cNvGrpSpPr/>
-        <p:nvPr/>
-      </p:nvGrpSpPr>
-      <p:grpSpPr>
-        <a:xfrm>
-          <a:off x="0" y="0"/>
-          <a:ext cx="0" cy="0"/>
-          <a:chOff x="0" y="0"/>
-          <a:chExt cx="0" cy="0"/>
-        </a:xfrm>
-      </p:grpSpPr>
-      <p:sp>
-        <p:nvSpPr>
-          <p:cNvPr id="2" name="Заголовок 1"/>
-          <p:cNvSpPr>
-            <a:spLocks noGrp="1"/>
-          </p:cNvSpPr>
-          <p:nvPr>
-            <p:ph type="title"/>
-          </p:nvPr>
-        </p:nvSpPr>
-        <p:spPr>
-          <a:xfrm>
-            <a:off x="838199" y="365125"/>
-            <a:ext cx="10596937" cy="1340385"/>
-          </a:xfrm>
-          <a:solidFill>
-            <a:schemeClr val="tx1"/>
-          </a:solidFill>
-        </p:spPr>
-        <p:txBody>
-          <a:bodyPr/>
-          <a:lstStyle/>
-          <a:p>
-            <a:r>
-              <a:rPr lang="en-US" b="1" dirty="0" smtClean="0">
-                <a:solidFill>
-                  <a:schemeClr val="bg1">
-                    <a:lumMod val="85000"/>
-                  </a:schemeClr>
-                </a:solidFill>
-              </a:rPr>
-              <a:t>Interlocked</a:t>
-            </a:r>
-            <a:endParaRPr lang="en-US" b="1" dirty="0">
-              <a:solidFill>
-                <a:schemeClr val="bg1">
-                  <a:lumMod val="85000"/>
-                </a:schemeClr>
-              </a:solidFill>
-            </a:endParaRPr>
-          </a:p>
-        </p:txBody>
-      </p:sp>
-      <p:sp>
-        <p:nvSpPr>
-          <p:cNvPr id="3" name="Объект 2"/>
-          <p:cNvSpPr>
-            <a:spLocks noGrp="1"/>
-          </p:cNvSpPr>
-          <p:nvPr>
-            <p:ph idx="1"/>
-          </p:nvPr>
-        </p:nvSpPr>
-        <p:spPr/>
-        <p:txBody>
-          <a:bodyPr/>
-          <a:lstStyle/>
-          <a:p>
-            <a:endParaRPr lang="en-US" dirty="0"/>
-          </a:p>
-        </p:txBody>
-      </p:sp>
-      <p:pic>
-        <p:nvPicPr>
-          <p:cNvPr id="5" name="Рисунок 4"/>
-          <p:cNvPicPr>
-            <a:picLocks noChangeAspect="1"/>
-          </p:cNvPicPr>
-          <p:nvPr/>
-        </p:nvPicPr>
-        <p:blipFill>
-          <a:blip r:embed="rId3"/>
-          <a:stretch>
-            <a:fillRect/>
-          </a:stretch>
-        </p:blipFill>
-        <p:spPr>
-          <a:xfrm>
-            <a:off x="2675964" y="1512943"/>
-            <a:ext cx="6840072" cy="4976702"/>
-          </a:xfrm>
-          <a:prstGeom prst="rect">
-            <a:avLst/>
-          </a:prstGeom>
-        </p:spPr>
-      </p:pic>
-    </p:spTree>
-    <p:extLst>
-      <p:ext uri="{BB962C8B-B14F-4D97-AF65-F5344CB8AC3E}">
-        <p14:creationId xmlns:p14="http://schemas.microsoft.com/office/powerpoint/2010/main" val="1079322736"/>
       </p:ext>
     </p:extLst>
   </p:cSld>
@@ -11556,6 +12015,142 @@
                   </a:schemeClr>
                 </a:solidFill>
               </a:rPr>
+              <a:t>Interlocked</a:t>
+            </a:r>
+            <a:endParaRPr lang="en-US" b="1" dirty="0">
+              <a:solidFill>
+                <a:schemeClr val="bg1">
+                  <a:lumMod val="85000"/>
+                </a:schemeClr>
+              </a:solidFill>
+            </a:endParaRPr>
+          </a:p>
+        </p:txBody>
+      </p:sp>
+      <p:sp>
+        <p:nvSpPr>
+          <p:cNvPr id="3" name="Объект 2"/>
+          <p:cNvSpPr>
+            <a:spLocks noGrp="1"/>
+          </p:cNvSpPr>
+          <p:nvPr>
+            <p:ph idx="1"/>
+          </p:nvPr>
+        </p:nvSpPr>
+        <p:spPr/>
+        <p:txBody>
+          <a:bodyPr/>
+          <a:lstStyle/>
+          <a:p>
+            <a:endParaRPr lang="en-US" dirty="0"/>
+          </a:p>
+        </p:txBody>
+      </p:sp>
+      <p:pic>
+        <p:nvPicPr>
+          <p:cNvPr id="5" name="Рисунок 4"/>
+          <p:cNvPicPr>
+            <a:picLocks noChangeAspect="1"/>
+          </p:cNvPicPr>
+          <p:nvPr/>
+        </p:nvPicPr>
+        <p:blipFill>
+          <a:blip r:embed="rId3"/>
+          <a:stretch>
+            <a:fillRect/>
+          </a:stretch>
+        </p:blipFill>
+        <p:spPr>
+          <a:xfrm>
+            <a:off x="2675964" y="1512943"/>
+            <a:ext cx="6840072" cy="4976702"/>
+          </a:xfrm>
+          <a:prstGeom prst="rect">
+            <a:avLst/>
+          </a:prstGeom>
+        </p:spPr>
+      </p:pic>
+    </p:spTree>
+    <p:extLst>
+      <p:ext uri="{BB962C8B-B14F-4D97-AF65-F5344CB8AC3E}">
+        <p14:creationId xmlns:p14="http://schemas.microsoft.com/office/powerpoint/2010/main" val="1079322736"/>
+      </p:ext>
+    </p:extLst>
+  </p:cSld>
+  <p:clrMapOvr>
+    <a:masterClrMapping/>
+  </p:clrMapOvr>
+  <mc:AlternateContent xmlns:mc="http://schemas.openxmlformats.org/markup-compatibility/2006" xmlns:p14="http://schemas.microsoft.com/office/powerpoint/2010/main">
+    <mc:Choice Requires="p14">
+      <p:transition spd="med" p14:dur="700">
+        <p:fade/>
+      </p:transition>
+    </mc:Choice>
+    <mc:Fallback xmlns="">
+      <p:transition spd="med">
+        <p:fade/>
+      </p:transition>
+    </mc:Fallback>
+  </mc:AlternateContent>
+</p:sld>
+</file>
+
+<file path=ppt/slides/slide41.xml><?xml version="1.0" encoding="utf-8"?>
+<p:sld xmlns:a="http://schemas.openxmlformats.org/drawingml/2006/main" xmlns:r="http://schemas.openxmlformats.org/officeDocument/2006/relationships" xmlns:p="http://schemas.openxmlformats.org/presentationml/2006/main">
+  <p:cSld>
+    <p:bg>
+      <p:bgPr>
+        <a:solidFill>
+          <a:schemeClr val="tx1"/>
+        </a:solidFill>
+        <a:effectLst/>
+      </p:bgPr>
+    </p:bg>
+    <p:spTree>
+      <p:nvGrpSpPr>
+        <p:cNvPr id="1" name=""/>
+        <p:cNvGrpSpPr/>
+        <p:nvPr/>
+      </p:nvGrpSpPr>
+      <p:grpSpPr>
+        <a:xfrm>
+          <a:off x="0" y="0"/>
+          <a:ext cx="0" cy="0"/>
+          <a:chOff x="0" y="0"/>
+          <a:chExt cx="0" cy="0"/>
+        </a:xfrm>
+      </p:grpSpPr>
+      <p:sp>
+        <p:nvSpPr>
+          <p:cNvPr id="2" name="Заголовок 1"/>
+          <p:cNvSpPr>
+            <a:spLocks noGrp="1"/>
+          </p:cNvSpPr>
+          <p:nvPr>
+            <p:ph type="title"/>
+          </p:nvPr>
+        </p:nvSpPr>
+        <p:spPr>
+          <a:xfrm>
+            <a:off x="838199" y="365125"/>
+            <a:ext cx="10596937" cy="1340385"/>
+          </a:xfrm>
+          <a:solidFill>
+            <a:schemeClr val="tx1"/>
+          </a:solidFill>
+        </p:spPr>
+        <p:txBody>
+          <a:bodyPr/>
+          <a:lstStyle/>
+          <a:p>
+            <a:r>
+              <a:rPr lang="en-US" b="1" dirty="0" smtClean="0">
+                <a:solidFill>
+                  <a:schemeClr val="bg1">
+                    <a:lumMod val="85000"/>
+                  </a:schemeClr>
+                </a:solidFill>
+              </a:rPr>
               <a:t>PLINQ</a:t>
             </a:r>
             <a:endParaRPr lang="en-US" b="1" dirty="0">
@@ -11636,7 +12231,7 @@
 </p:sld>
 </file>
 
-<file path=ppt/slides/slide41.xml><?xml version="1.0" encoding="utf-8"?>
+<file path=ppt/slides/slide42.xml><?xml version="1.0" encoding="utf-8"?>
 <p:sld xmlns:a="http://schemas.openxmlformats.org/drawingml/2006/main" xmlns:r="http://schemas.openxmlformats.org/officeDocument/2006/relationships" xmlns:p="http://schemas.openxmlformats.org/presentationml/2006/main">
   <p:cSld>
     <p:bg>
@@ -11772,7 +12367,7 @@
 </p:sld>
 </file>
 
-<file path=ppt/slides/slide42.xml><?xml version="1.0" encoding="utf-8"?>
+<file path=ppt/slides/slide43.xml><?xml version="1.0" encoding="utf-8"?>
 <p:sld xmlns:a="http://schemas.openxmlformats.org/drawingml/2006/main" xmlns:r="http://schemas.openxmlformats.org/officeDocument/2006/relationships" xmlns:p="http://schemas.openxmlformats.org/presentationml/2006/main">
   <p:cSld>
     <p:bg>

</xml_diff>